<commit_message>
JavaScript Fundamentals - Assignments - Loops
</commit_message>
<xml_diff>
--- a/JavaScript Fundamentals/07. Arrays/Lecture/Arrays.pptx
+++ b/JavaScript Fundamentals/07. Arrays/Lecture/Arrays.pptx
@@ -177,10 +177,10 @@
   </p:defaultTextStyle>
   <p:extLst>
     <p:ext uri="{EFAFB233-063F-42B5-8137-9DF3F51BA10A}">
-      <p15:sldGuideLst xmlns:p15="http://schemas.microsoft.com/office/powerpoint/2012/main" xmlns=""/>
+      <p15:sldGuideLst xmlns="" xmlns:p15="http://schemas.microsoft.com/office/powerpoint/2012/main"/>
     </p:ext>
     <p:ext uri="{2D200454-40CA-4A62-9FC3-DE9A4176ACB9}">
-      <p15:notesGuideLst xmlns:p15="http://schemas.microsoft.com/office/powerpoint/2012/main" xmlns="">
+      <p15:notesGuideLst xmlns="" xmlns:p15="http://schemas.microsoft.com/office/powerpoint/2012/main">
         <p15:guide id="1" orient="horz" pos="2928">
           <p15:clr>
             <a:srgbClr val="A4A3A4"/>
@@ -312,7 +312,7 @@
             <a:fld id="{3BF7C7B5-275F-4D1F-9AB4-9255447DBC73}" type="datetimeFigureOut">
               <a:rPr lang="en-US"/>
               <a:pPr/>
-              <a:t>4/29/2014</a:t>
+              <a:t>5/7/2014</a:t>
             </a:fld>
             <a:endParaRPr lang="en-US" dirty="0"/>
           </a:p>
@@ -543,7 +543,7 @@
             <a:fld id="{9B46F231-FB2B-4655-A644-E2477325E686}" type="datetimeFigureOut">
               <a:rPr lang="en-US"/>
               <a:pPr/>
-              <a:t>4/29/2014</a:t>
+              <a:t>5/7/2014</a:t>
             </a:fld>
             <a:endParaRPr lang="en-US" dirty="0"/>
           </a:p>
@@ -10333,7 +10333,24 @@
                 <a:latin typeface="Consolas" pitchFamily="49" charset="0"/>
                 <a:cs typeface="Consolas" pitchFamily="49" charset="0"/>
               </a:rPr>
-              <a:t>reversed[length-index-1] </a:t>
+              <a:t>reversed[length – index - 1</a:t>
+            </a:r>
+            <a:r>
+              <a:rPr lang="en-US" sz="2000" b="1" noProof="1" smtClean="0">
+                <a:solidFill>
+                  <a:srgbClr val="8CF4F2"/>
+                </a:solidFill>
+                <a:effectLst>
+                  <a:outerShdw blurRad="38100" dist="38100" dir="2700000" algn="tl">
+                    <a:srgbClr val="000000">
+                      <a:alpha val="43137"/>
+                    </a:srgbClr>
+                  </a:outerShdw>
+                </a:effectLst>
+                <a:latin typeface="Consolas" pitchFamily="49" charset="0"/>
+                <a:cs typeface="Consolas" pitchFamily="49" charset="0"/>
+              </a:rPr>
+              <a:t>] </a:t>
             </a:r>
             <a:r>
               <a:rPr lang="en-US" sz="2000" b="1" noProof="1">
@@ -11029,8 +11046,8 @@
         </p:nvSpPr>
         <p:spPr bwMode="auto">
           <a:xfrm>
-            <a:off x="611188" y="4267200"/>
-            <a:ext cx="7920037" cy="1446550"/>
+            <a:off x="381000" y="4267200"/>
+            <a:ext cx="8305800" cy="1107996"/>
           </a:xfrm>
           <a:prstGeom prst="rect">
             <a:avLst/>
@@ -11135,7 +11152,58 @@
                 <a:latin typeface="Consolas" pitchFamily="49" charset="0"/>
                 <a:cs typeface="Consolas" pitchFamily="49" charset="0"/>
               </a:rPr>
-              <a:t>array.length; index++)</a:t>
+              <a:t>array.length; index</a:t>
+            </a:r>
+            <a:r>
+              <a:rPr lang="en-US" sz="2200" b="1" noProof="1" smtClean="0">
+                <a:solidFill>
+                  <a:srgbClr val="8CF4F2"/>
+                </a:solidFill>
+                <a:effectLst>
+                  <a:outerShdw blurRad="38100" dist="38100" dir="2700000" algn="tl">
+                    <a:srgbClr val="000000">
+                      <a:alpha val="43137"/>
+                    </a:srgbClr>
+                  </a:outerShdw>
+                </a:effectLst>
+                <a:latin typeface="Consolas" pitchFamily="49" charset="0"/>
+                <a:cs typeface="Consolas" pitchFamily="49" charset="0"/>
+              </a:rPr>
+              <a:t>++)</a:t>
+            </a:r>
+            <a:r>
+              <a:rPr lang="en-US" sz="2200" b="1" noProof="1">
+                <a:solidFill>
+                  <a:srgbClr val="8CF4F2"/>
+                </a:solidFill>
+                <a:effectLst>
+                  <a:outerShdw blurRad="38100" dist="38100" dir="2700000" algn="tl">
+                    <a:srgbClr val="000000">
+                      <a:alpha val="43137"/>
+                    </a:srgbClr>
+                  </a:outerShdw>
+                </a:effectLst>
+                <a:latin typeface="Consolas" pitchFamily="49" charset="0"/>
+                <a:cs typeface="Consolas" pitchFamily="49" charset="0"/>
+              </a:rPr>
+              <a:t> </a:t>
+            </a:r>
+            <a:r>
+              <a:rPr lang="en-US" sz="2200" b="1" noProof="1" smtClean="0">
+                <a:solidFill>
+                  <a:srgbClr val="8CF4F2"/>
+                </a:solidFill>
+                <a:effectLst>
+                  <a:outerShdw blurRad="38100" dist="38100" dir="2700000" algn="tl">
+                    <a:srgbClr val="000000">
+                      <a:alpha val="43137"/>
+                    </a:srgbClr>
+                  </a:outerShdw>
+                </a:effectLst>
+                <a:latin typeface="Consolas" pitchFamily="49" charset="0"/>
+                <a:cs typeface="Consolas" pitchFamily="49" charset="0"/>
+              </a:rPr>
+              <a:t>{</a:t>
             </a:r>
             <a:endParaRPr lang="en-US" sz="2200" b="1" noProof="1">
               <a:solidFill>
@@ -11151,37 +11219,6 @@
               <a:latin typeface="Consolas" pitchFamily="49" charset="0"/>
               <a:cs typeface="Consolas" pitchFamily="49" charset="0"/>
             </a:endParaRPr>
-          </a:p>
-          <a:p>
-            <a:pPr eaLnBrk="0" hangingPunct="0">
-              <a:spcBef>
-                <a:spcPts val="0"/>
-              </a:spcBef>
-              <a:buClr>
-                <a:schemeClr val="accent5">
-                  <a:lumMod val="40000"/>
-                  <a:lumOff val="60000"/>
-                </a:schemeClr>
-              </a:buClr>
-              <a:buSzPct val="70000"/>
-            </a:pPr>
-            <a:r>
-              <a:rPr lang="en-US" sz="2200" b="1" noProof="1">
-                <a:solidFill>
-                  <a:srgbClr val="8CF4F2"/>
-                </a:solidFill>
-                <a:effectLst>
-                  <a:outerShdw blurRad="38100" dist="38100" dir="2700000" algn="tl">
-                    <a:srgbClr val="000000">
-                      <a:alpha val="43137"/>
-                    </a:srgbClr>
-                  </a:outerShdw>
-                </a:effectLst>
-                <a:latin typeface="Consolas" pitchFamily="49" charset="0"/>
-                <a:cs typeface="Consolas" pitchFamily="49" charset="0"/>
-              </a:rPr>
-              <a:t>{</a:t>
-            </a:r>
           </a:p>
           <a:p>
             <a:pPr eaLnBrk="0" hangingPunct="0">
@@ -12666,7 +12703,7 @@
         <p:spPr bwMode="auto">
           <a:xfrm>
             <a:off x="838200" y="2362200"/>
-            <a:ext cx="7415212" cy="3477875"/>
+            <a:ext cx="7415212" cy="3170099"/>
           </a:xfrm>
           <a:prstGeom prst="rect">
             <a:avLst/>
@@ -12754,7 +12791,7 @@
                 <a:latin typeface="Consolas" pitchFamily="49" charset="0"/>
                 <a:cs typeface="Consolas" pitchFamily="49" charset="0"/>
               </a:rPr>
-              <a:t>=[</a:t>
+              <a:t>= [</a:t>
             </a:r>
             <a:endParaRPr lang="en-US" sz="2000" b="1" noProof="1">
               <a:solidFill>
@@ -12802,7 +12839,7 @@
               <a:t>    </a:t>
             </a:r>
             <a:r>
-              <a:rPr lang="en-US" sz="2000" b="1" noProof="1">
+              <a:rPr lang="en-US" sz="2000" b="1" noProof="1" smtClean="0">
                 <a:solidFill>
                   <a:srgbClr val="8CF4F2"/>
                 </a:solidFill>
@@ -12816,8 +12853,39 @@
                 <a:latin typeface="Consolas" pitchFamily="49" charset="0"/>
                 <a:cs typeface="Consolas" pitchFamily="49" charset="0"/>
               </a:rPr>
-              <a:t>"Sofia",</a:t>
-            </a:r>
+              <a:t>'Sofia</a:t>
+            </a:r>
+            <a:r>
+              <a:rPr lang="en-US" sz="2000" b="1" noProof="1">
+                <a:solidFill>
+                  <a:srgbClr val="8CF4F2"/>
+                </a:solidFill>
+                <a:effectLst>
+                  <a:outerShdw blurRad="38100" dist="38100" dir="2700000" algn="tl">
+                    <a:srgbClr val="000000">
+                      <a:alpha val="43137"/>
+                    </a:srgbClr>
+                  </a:outerShdw>
+                </a:effectLst>
+                <a:latin typeface="Consolas" pitchFamily="49" charset="0"/>
+                <a:cs typeface="Consolas" pitchFamily="49" charset="0"/>
+              </a:rPr>
+              <a:t>',</a:t>
+            </a:r>
+            <a:endParaRPr lang="en-US" sz="2000" b="1" noProof="1">
+              <a:solidFill>
+                <a:srgbClr val="8CF4F2"/>
+              </a:solidFill>
+              <a:effectLst>
+                <a:outerShdw blurRad="38100" dist="38100" dir="2700000" algn="tl">
+                  <a:srgbClr val="000000">
+                    <a:alpha val="43137"/>
+                  </a:srgbClr>
+                </a:outerShdw>
+              </a:effectLst>
+              <a:latin typeface="Consolas" pitchFamily="49" charset="0"/>
+              <a:cs typeface="Consolas" pitchFamily="49" charset="0"/>
+            </a:endParaRPr>
           </a:p>
           <a:p>
             <a:pPr eaLnBrk="0" hangingPunct="0">
@@ -12850,7 +12918,7 @@
               <a:t>    </a:t>
             </a:r>
             <a:r>
-              <a:rPr lang="en-US" sz="2000" b="1" noProof="1">
+              <a:rPr lang="en-US" sz="2000" b="1" noProof="1" smtClean="0">
                 <a:solidFill>
                   <a:srgbClr val="8CF4F2"/>
                 </a:solidFill>
@@ -12864,8 +12932,39 @@
                 <a:latin typeface="Consolas" pitchFamily="49" charset="0"/>
                 <a:cs typeface="Consolas" pitchFamily="49" charset="0"/>
               </a:rPr>
-              <a:t>"Washington",</a:t>
-            </a:r>
+              <a:t>'Washington</a:t>
+            </a:r>
+            <a:r>
+              <a:rPr lang="en-US" sz="2000" b="1" noProof="1">
+                <a:solidFill>
+                  <a:srgbClr val="8CF4F2"/>
+                </a:solidFill>
+                <a:effectLst>
+                  <a:outerShdw blurRad="38100" dist="38100" dir="2700000" algn="tl">
+                    <a:srgbClr val="000000">
+                      <a:alpha val="43137"/>
+                    </a:srgbClr>
+                  </a:outerShdw>
+                </a:effectLst>
+                <a:latin typeface="Consolas" pitchFamily="49" charset="0"/>
+                <a:cs typeface="Consolas" pitchFamily="49" charset="0"/>
+              </a:rPr>
+              <a:t>',</a:t>
+            </a:r>
+            <a:endParaRPr lang="en-US" sz="2000" b="1" noProof="1">
+              <a:solidFill>
+                <a:srgbClr val="8CF4F2"/>
+              </a:solidFill>
+              <a:effectLst>
+                <a:outerShdw blurRad="38100" dist="38100" dir="2700000" algn="tl">
+                  <a:srgbClr val="000000">
+                    <a:alpha val="43137"/>
+                  </a:srgbClr>
+                </a:outerShdw>
+              </a:effectLst>
+              <a:latin typeface="Consolas" pitchFamily="49" charset="0"/>
+              <a:cs typeface="Consolas" pitchFamily="49" charset="0"/>
+            </a:endParaRPr>
           </a:p>
           <a:p>
             <a:pPr eaLnBrk="0" hangingPunct="0">
@@ -12898,7 +12997,7 @@
               <a:t>    </a:t>
             </a:r>
             <a:r>
-              <a:rPr lang="en-US" sz="2000" b="1" noProof="1">
+              <a:rPr lang="en-US" sz="2000" b="1" noProof="1" smtClean="0">
                 <a:solidFill>
                   <a:srgbClr val="8CF4F2"/>
                 </a:solidFill>
@@ -12912,8 +13011,39 @@
                 <a:latin typeface="Consolas" pitchFamily="49" charset="0"/>
                 <a:cs typeface="Consolas" pitchFamily="49" charset="0"/>
               </a:rPr>
-              <a:t>"London",</a:t>
-            </a:r>
+              <a:t>'London</a:t>
+            </a:r>
+            <a:r>
+              <a:rPr lang="en-US" sz="2000" b="1" noProof="1">
+                <a:solidFill>
+                  <a:srgbClr val="8CF4F2"/>
+                </a:solidFill>
+                <a:effectLst>
+                  <a:outerShdw blurRad="38100" dist="38100" dir="2700000" algn="tl">
+                    <a:srgbClr val="000000">
+                      <a:alpha val="43137"/>
+                    </a:srgbClr>
+                  </a:outerShdw>
+                </a:effectLst>
+                <a:latin typeface="Consolas" pitchFamily="49" charset="0"/>
+                <a:cs typeface="Consolas" pitchFamily="49" charset="0"/>
+              </a:rPr>
+              <a:t>',</a:t>
+            </a:r>
+            <a:endParaRPr lang="en-US" sz="2000" b="1" noProof="1">
+              <a:solidFill>
+                <a:srgbClr val="8CF4F2"/>
+              </a:solidFill>
+              <a:effectLst>
+                <a:outerShdw blurRad="38100" dist="38100" dir="2700000" algn="tl">
+                  <a:srgbClr val="000000">
+                    <a:alpha val="43137"/>
+                  </a:srgbClr>
+                </a:outerShdw>
+              </a:effectLst>
+              <a:latin typeface="Consolas" pitchFamily="49" charset="0"/>
+              <a:cs typeface="Consolas" pitchFamily="49" charset="0"/>
+            </a:endParaRPr>
           </a:p>
           <a:p>
             <a:pPr eaLnBrk="0" hangingPunct="0">
@@ -12943,10 +13073,10 @@
                 <a:latin typeface="Consolas" pitchFamily="49" charset="0"/>
                 <a:cs typeface="Consolas" pitchFamily="49" charset="0"/>
               </a:rPr>
-              <a:t>    "</a:t>
-            </a:r>
-            <a:r>
-              <a:rPr lang="en-US" sz="2000" b="1" noProof="1">
+              <a:t>    </a:t>
+            </a:r>
+            <a:r>
+              <a:rPr lang="en-US" sz="2000" b="1" noProof="1" smtClean="0">
                 <a:solidFill>
                   <a:srgbClr val="8CF4F2"/>
                 </a:solidFill>
@@ -12960,7 +13090,7 @@
                 <a:latin typeface="Consolas" pitchFamily="49" charset="0"/>
                 <a:cs typeface="Consolas" pitchFamily="49" charset="0"/>
               </a:rPr>
-              <a:t>Paris"</a:t>
+              <a:t>'Paris'</a:t>
             </a:r>
           </a:p>
           <a:p>
@@ -12977,7 +13107,7 @@
               <a:buSzPct val="70000"/>
             </a:pPr>
             <a:r>
-              <a:rPr lang="en-US" sz="2000" b="1" noProof="1">
+              <a:rPr lang="en-US" sz="2000" b="1" noProof="1" smtClean="0">
                 <a:solidFill>
                   <a:srgbClr val="8CF4F2"/>
                 </a:solidFill>
@@ -12991,25 +13121,22 @@
                 <a:latin typeface="Consolas" pitchFamily="49" charset="0"/>
                 <a:cs typeface="Consolas" pitchFamily="49" charset="0"/>
               </a:rPr>
-              <a:t>]</a:t>
-            </a:r>
-            <a:r>
-              <a:rPr lang="en-US" sz="2000" b="1" noProof="1" smtClean="0">
-                <a:solidFill>
-                  <a:srgbClr val="8CF4F2"/>
-                </a:solidFill>
-                <a:effectLst>
-                  <a:outerShdw blurRad="38100" dist="38100" dir="2700000" algn="tl">
-                    <a:srgbClr val="000000">
-                      <a:alpha val="43137"/>
-                    </a:srgbClr>
-                  </a:outerShdw>
-                </a:effectLst>
-                <a:latin typeface="Consolas" pitchFamily="49" charset="0"/>
-                <a:cs typeface="Consolas" pitchFamily="49" charset="0"/>
-              </a:rPr>
-              <a:t>;</a:t>
-            </a:r>
+              <a:t>];</a:t>
+            </a:r>
+            <a:endParaRPr lang="en-US" sz="2000" b="1" noProof="1" smtClean="0">
+              <a:solidFill>
+                <a:srgbClr val="8CF4F2"/>
+              </a:solidFill>
+              <a:effectLst>
+                <a:outerShdw blurRad="38100" dist="38100" dir="2700000" algn="tl">
+                  <a:srgbClr val="000000">
+                    <a:alpha val="43137"/>
+                  </a:srgbClr>
+                </a:outerShdw>
+              </a:effectLst>
+              <a:latin typeface="Consolas" pitchFamily="49" charset="0"/>
+              <a:cs typeface="Consolas" pitchFamily="49" charset="0"/>
+            </a:endParaRPr>
           </a:p>
           <a:p>
             <a:pPr eaLnBrk="0" hangingPunct="0">
@@ -13084,24 +13211,10 @@
                 <a:latin typeface="Consolas" pitchFamily="49" charset="0"/>
                 <a:cs typeface="Consolas" pitchFamily="49" charset="0"/>
               </a:rPr>
-              <a:t>in capitals)</a:t>
-            </a:r>
-          </a:p>
-          <a:p>
-            <a:pPr eaLnBrk="0" hangingPunct="0">
-              <a:spcBef>
-                <a:spcPts val="0"/>
-              </a:spcBef>
-              <a:buClr>
-                <a:schemeClr val="accent5">
-                  <a:lumMod val="40000"/>
-                  <a:lumOff val="60000"/>
-                </a:schemeClr>
-              </a:buClr>
-              <a:buSzPct val="70000"/>
-            </a:pPr>
-            <a:r>
-              <a:rPr lang="en-US" sz="2000" b="1" noProof="1">
+              <a:t>in capitals</a:t>
+            </a:r>
+            <a:r>
+              <a:rPr lang="en-US" sz="2000" b="1" noProof="1" smtClean="0">
                 <a:solidFill>
                   <a:srgbClr val="8CF4F2"/>
                 </a:solidFill>
@@ -13115,8 +13228,22 @@
                 <a:latin typeface="Consolas" pitchFamily="49" charset="0"/>
                 <a:cs typeface="Consolas" pitchFamily="49" charset="0"/>
               </a:rPr>
-              <a:t>{</a:t>
-            </a:r>
+              <a:t>) {</a:t>
+            </a:r>
+            <a:endParaRPr lang="en-US" sz="2000" b="1" noProof="1">
+              <a:solidFill>
+                <a:srgbClr val="8CF4F2"/>
+              </a:solidFill>
+              <a:effectLst>
+                <a:outerShdw blurRad="38100" dist="38100" dir="2700000" algn="tl">
+                  <a:srgbClr val="000000">
+                    <a:alpha val="43137"/>
+                  </a:srgbClr>
+                </a:outerShdw>
+              </a:effectLst>
+              <a:latin typeface="Consolas" pitchFamily="49" charset="0"/>
+              <a:cs typeface="Consolas" pitchFamily="49" charset="0"/>
+            </a:endParaRPr>
           </a:p>
           <a:p>
             <a:pPr eaLnBrk="0" hangingPunct="0">
@@ -14271,7 +14398,7 @@
         <p:spPr>
           <a:xfrm>
             <a:off x="685800" y="3657600"/>
-            <a:ext cx="7772400" cy="2777683"/>
+            <a:ext cx="7772400" cy="2854628"/>
           </a:xfrm>
           <a:prstGeom prst="rect">
             <a:avLst/>
@@ -14587,7 +14714,67 @@
                 <a:latin typeface="Consolas" pitchFamily="49" charset="0"/>
                 <a:cs typeface="Consolas" pitchFamily="49" charset="0"/>
               </a:rPr>
-              <a:t>console.log(numbers.join("|")); // result</a:t>
+              <a:t>console.log(numbers.join</a:t>
+            </a:r>
+            <a:r>
+              <a:rPr lang="en-US" sz="1900" noProof="1" smtClean="0">
+                <a:solidFill>
+                  <a:srgbClr val="8CF4F2"/>
+                </a:solidFill>
+                <a:latin typeface="Consolas" pitchFamily="49" charset="0"/>
+                <a:cs typeface="Consolas" pitchFamily="49" charset="0"/>
+              </a:rPr>
+              <a:t>(</a:t>
+            </a:r>
+            <a:r>
+              <a:rPr lang="en-US" sz="2000" noProof="1" smtClean="0">
+                <a:solidFill>
+                  <a:srgbClr val="8CF4F2"/>
+                </a:solidFill>
+                <a:latin typeface="Consolas" pitchFamily="49" charset="0"/>
+                <a:cs typeface="Consolas" pitchFamily="49" charset="0"/>
+              </a:rPr>
+              <a:t>'</a:t>
+            </a:r>
+            <a:r>
+              <a:rPr lang="en-US" sz="1900" noProof="1" smtClean="0">
+                <a:solidFill>
+                  <a:srgbClr val="8CF4F2"/>
+                </a:solidFill>
+                <a:latin typeface="Consolas" pitchFamily="49" charset="0"/>
+                <a:cs typeface="Consolas" pitchFamily="49" charset="0"/>
+              </a:rPr>
+              <a:t>|</a:t>
+            </a:r>
+            <a:r>
+              <a:rPr lang="en-US" sz="2000" noProof="1">
+                <a:solidFill>
+                  <a:srgbClr val="8CF4F2"/>
+                </a:solidFill>
+                <a:latin typeface="Consolas" pitchFamily="49" charset="0"/>
+                <a:cs typeface="Consolas" pitchFamily="49" charset="0"/>
+              </a:rPr>
+              <a:t>'</a:t>
+            </a:r>
+            <a:r>
+              <a:rPr lang="en-US" sz="1900" noProof="1" smtClean="0">
+                <a:solidFill>
+                  <a:srgbClr val="8CF4F2"/>
+                </a:solidFill>
+                <a:latin typeface="Consolas" pitchFamily="49" charset="0"/>
+                <a:cs typeface="Consolas" pitchFamily="49" charset="0"/>
+              </a:rPr>
+              <a:t>)); </a:t>
+            </a:r>
+            <a:r>
+              <a:rPr lang="en-US" sz="1900" noProof="1" smtClean="0">
+                <a:solidFill>
+                  <a:srgbClr val="8CF4F2"/>
+                </a:solidFill>
+                <a:latin typeface="Consolas" pitchFamily="49" charset="0"/>
+                <a:cs typeface="Consolas" pitchFamily="49" charset="0"/>
+              </a:rPr>
+              <a:t>// result</a:t>
             </a:r>
             <a:r>
               <a:rPr lang="en-US" sz="1900" noProof="1">
@@ -14662,7 +14849,57 @@
                 <a:latin typeface="Consolas" pitchFamily="49" charset="0"/>
                 <a:cs typeface="Consolas" pitchFamily="49" charset="0"/>
               </a:rPr>
-              <a:t>console.log(numbers.join("|")); </a:t>
+              <a:t>console.log(numbers.join</a:t>
+            </a:r>
+            <a:r>
+              <a:rPr lang="en-US" sz="1900" noProof="1" smtClean="0">
+                <a:solidFill>
+                  <a:srgbClr val="8CF4F2"/>
+                </a:solidFill>
+                <a:latin typeface="Consolas" pitchFamily="49" charset="0"/>
+                <a:cs typeface="Consolas" pitchFamily="49" charset="0"/>
+              </a:rPr>
+              <a:t>(</a:t>
+            </a:r>
+            <a:r>
+              <a:rPr lang="en-US" sz="2000" noProof="1" smtClean="0">
+                <a:solidFill>
+                  <a:srgbClr val="8CF4F2"/>
+                </a:solidFill>
+                <a:latin typeface="Consolas" pitchFamily="49" charset="0"/>
+                <a:cs typeface="Consolas" pitchFamily="49" charset="0"/>
+              </a:rPr>
+              <a:t>'</a:t>
+            </a:r>
+            <a:r>
+              <a:rPr lang="en-US" sz="1900" noProof="1" smtClean="0">
+                <a:solidFill>
+                  <a:srgbClr val="8CF4F2"/>
+                </a:solidFill>
+                <a:latin typeface="Consolas" pitchFamily="49" charset="0"/>
+                <a:cs typeface="Consolas" pitchFamily="49" charset="0"/>
+              </a:rPr>
+              <a:t>|</a:t>
+            </a:r>
+            <a:r>
+              <a:rPr lang="en-US" sz="2000" noProof="1">
+                <a:solidFill>
+                  <a:srgbClr val="8CF4F2"/>
+                </a:solidFill>
+                <a:latin typeface="Consolas" pitchFamily="49" charset="0"/>
+                <a:cs typeface="Consolas" pitchFamily="49" charset="0"/>
+              </a:rPr>
+              <a:t>'</a:t>
+            </a:r>
+            <a:r>
+              <a:rPr lang="en-US" sz="1900" noProof="1" smtClean="0">
+                <a:solidFill>
+                  <a:srgbClr val="8CF4F2"/>
+                </a:solidFill>
+                <a:latin typeface="Consolas" pitchFamily="49" charset="0"/>
+                <a:cs typeface="Consolas" pitchFamily="49" charset="0"/>
+              </a:rPr>
+              <a:t>)); </a:t>
             </a:r>
             <a:r>
               <a:rPr lang="en-US" sz="1900" noProof="1" smtClean="0">
@@ -14740,7 +14977,67 @@
                 <a:latin typeface="Consolas" pitchFamily="49" charset="0"/>
                 <a:cs typeface="Consolas" pitchFamily="49" charset="0"/>
               </a:rPr>
-              <a:t>console.log(numbers.join("|")); // result: 0|1|2|3|4</a:t>
+              <a:t>console.log(numbers.join</a:t>
+            </a:r>
+            <a:r>
+              <a:rPr lang="en-US" sz="1900" noProof="1" smtClean="0">
+                <a:solidFill>
+                  <a:srgbClr val="8CF4F2"/>
+                </a:solidFill>
+                <a:latin typeface="Consolas" pitchFamily="49" charset="0"/>
+                <a:cs typeface="Consolas" pitchFamily="49" charset="0"/>
+              </a:rPr>
+              <a:t>(</a:t>
+            </a:r>
+            <a:r>
+              <a:rPr lang="en-US" sz="2000" noProof="1" smtClean="0">
+                <a:solidFill>
+                  <a:srgbClr val="8CF4F2"/>
+                </a:solidFill>
+                <a:latin typeface="Consolas" pitchFamily="49" charset="0"/>
+                <a:cs typeface="Consolas" pitchFamily="49" charset="0"/>
+              </a:rPr>
+              <a:t>'</a:t>
+            </a:r>
+            <a:r>
+              <a:rPr lang="en-US" sz="1900" noProof="1" smtClean="0">
+                <a:solidFill>
+                  <a:srgbClr val="8CF4F2"/>
+                </a:solidFill>
+                <a:latin typeface="Consolas" pitchFamily="49" charset="0"/>
+                <a:cs typeface="Consolas" pitchFamily="49" charset="0"/>
+              </a:rPr>
+              <a:t>|</a:t>
+            </a:r>
+            <a:r>
+              <a:rPr lang="en-US" sz="2000" noProof="1">
+                <a:solidFill>
+                  <a:srgbClr val="8CF4F2"/>
+                </a:solidFill>
+                <a:latin typeface="Consolas" pitchFamily="49" charset="0"/>
+                <a:cs typeface="Consolas" pitchFamily="49" charset="0"/>
+              </a:rPr>
+              <a:t>'</a:t>
+            </a:r>
+            <a:r>
+              <a:rPr lang="en-US" sz="1900" noProof="1" smtClean="0">
+                <a:solidFill>
+                  <a:srgbClr val="8CF4F2"/>
+                </a:solidFill>
+                <a:latin typeface="Consolas" pitchFamily="49" charset="0"/>
+                <a:cs typeface="Consolas" pitchFamily="49" charset="0"/>
+              </a:rPr>
+              <a:t>)); </a:t>
+            </a:r>
+            <a:r>
+              <a:rPr lang="en-US" sz="1900" noProof="1" smtClean="0">
+                <a:solidFill>
+                  <a:srgbClr val="8CF4F2"/>
+                </a:solidFill>
+                <a:latin typeface="Consolas" pitchFamily="49" charset="0"/>
+                <a:cs typeface="Consolas" pitchFamily="49" charset="0"/>
+              </a:rPr>
+              <a:t>// result: 0|1|2|3|4</a:t>
             </a:r>
           </a:p>
           <a:p>
@@ -14788,7 +15085,67 @@
                 <a:latin typeface="Consolas" pitchFamily="49" charset="0"/>
                 <a:cs typeface="Consolas" pitchFamily="49" charset="0"/>
               </a:rPr>
-              <a:t>console.log(numbers.join("|")); // result</a:t>
+              <a:t>console.log(numbers.join</a:t>
+            </a:r>
+            <a:r>
+              <a:rPr lang="en-US" sz="1900" noProof="1" smtClean="0">
+                <a:solidFill>
+                  <a:srgbClr val="8CF4F2"/>
+                </a:solidFill>
+                <a:latin typeface="Consolas" pitchFamily="49" charset="0"/>
+                <a:cs typeface="Consolas" pitchFamily="49" charset="0"/>
+              </a:rPr>
+              <a:t>(</a:t>
+            </a:r>
+            <a:r>
+              <a:rPr lang="en-US" sz="2000" noProof="1" smtClean="0">
+                <a:solidFill>
+                  <a:srgbClr val="8CF4F2"/>
+                </a:solidFill>
+                <a:latin typeface="Consolas" pitchFamily="49" charset="0"/>
+                <a:cs typeface="Consolas" pitchFamily="49" charset="0"/>
+              </a:rPr>
+              <a:t>'</a:t>
+            </a:r>
+            <a:r>
+              <a:rPr lang="en-US" sz="1900" noProof="1" smtClean="0">
+                <a:solidFill>
+                  <a:srgbClr val="8CF4F2"/>
+                </a:solidFill>
+                <a:latin typeface="Consolas" pitchFamily="49" charset="0"/>
+                <a:cs typeface="Consolas" pitchFamily="49" charset="0"/>
+              </a:rPr>
+              <a:t>|</a:t>
+            </a:r>
+            <a:r>
+              <a:rPr lang="en-US" sz="2000" noProof="1">
+                <a:solidFill>
+                  <a:srgbClr val="8CF4F2"/>
+                </a:solidFill>
+                <a:latin typeface="Consolas" pitchFamily="49" charset="0"/>
+                <a:cs typeface="Consolas" pitchFamily="49" charset="0"/>
+              </a:rPr>
+              <a:t>'</a:t>
+            </a:r>
+            <a:r>
+              <a:rPr lang="en-US" sz="1900" noProof="1" smtClean="0">
+                <a:solidFill>
+                  <a:srgbClr val="8CF4F2"/>
+                </a:solidFill>
+                <a:latin typeface="Consolas" pitchFamily="49" charset="0"/>
+                <a:cs typeface="Consolas" pitchFamily="49" charset="0"/>
+              </a:rPr>
+              <a:t>)); </a:t>
+            </a:r>
+            <a:r>
+              <a:rPr lang="en-US" sz="1900" noProof="1" smtClean="0">
+                <a:solidFill>
+                  <a:srgbClr val="8CF4F2"/>
+                </a:solidFill>
+                <a:latin typeface="Consolas" pitchFamily="49" charset="0"/>
+                <a:cs typeface="Consolas" pitchFamily="49" charset="0"/>
+              </a:rPr>
+              <a:t>// result</a:t>
             </a:r>
             <a:r>
               <a:rPr lang="en-US" sz="1900" noProof="1">
@@ -15720,7 +16077,17 @@
                 <a:latin typeface="Consolas" pitchFamily="49" charset="0"/>
                 <a:cs typeface="Consolas" pitchFamily="49" charset="0"/>
               </a:rPr>
-              <a:t>console.log(numbers.join(", ")); </a:t>
+              <a:t>console.log(numbers.join</a:t>
+            </a:r>
+            <a:r>
+              <a:rPr lang="en-US" sz="1800" noProof="1">
+                <a:solidFill>
+                  <a:srgbClr val="8CF4F2"/>
+                </a:solidFill>
+                <a:latin typeface="Consolas" pitchFamily="49" charset="0"/>
+                <a:cs typeface="Consolas" pitchFamily="49" charset="0"/>
+              </a:rPr>
+              <a:t>(', ')); </a:t>
             </a:r>
             <a:endParaRPr lang="en-US" sz="1800" noProof="1" smtClean="0">
               <a:solidFill>
@@ -16099,7 +16466,27 @@
                 <a:latin typeface="Consolas" pitchFamily="49" charset="0"/>
                 <a:cs typeface="Consolas" pitchFamily="49" charset="0"/>
               </a:rPr>
-              <a:t>var numbers = [5,4,23,2];</a:t>
+              <a:t>var numbers = [</a:t>
+            </a:r>
+            <a:r>
+              <a:rPr lang="en-US" sz="1800" noProof="1" smtClean="0">
+                <a:solidFill>
+                  <a:srgbClr val="8CF4F2"/>
+                </a:solidFill>
+                <a:latin typeface="Consolas" pitchFamily="49" charset="0"/>
+                <a:cs typeface="Consolas" pitchFamily="49" charset="0"/>
+              </a:rPr>
+              <a:t>5, 4, 23, 2</a:t>
+            </a:r>
+            <a:r>
+              <a:rPr lang="en-US" sz="1800" noProof="1" smtClean="0">
+                <a:solidFill>
+                  <a:srgbClr val="8CF4F2"/>
+                </a:solidFill>
+                <a:latin typeface="Consolas" pitchFamily="49" charset="0"/>
+                <a:cs typeface="Consolas" pitchFamily="49" charset="0"/>
+              </a:rPr>
+              <a:t>];</a:t>
             </a:r>
           </a:p>
           <a:p>
@@ -16148,7 +16535,27 @@
                 <a:latin typeface="Consolas" pitchFamily="49" charset="0"/>
                 <a:cs typeface="Consolas" pitchFamily="49" charset="0"/>
               </a:rPr>
-              <a:t>console.log(numbers.join(", </a:t>
+              <a:t>console.log(numbers.join</a:t>
+            </a:r>
+            <a:r>
+              <a:rPr lang="en-US" sz="1800" noProof="1">
+                <a:solidFill>
+                  <a:srgbClr val="8CF4F2"/>
+                </a:solidFill>
+                <a:latin typeface="Consolas" pitchFamily="49" charset="0"/>
+                <a:cs typeface="Consolas" pitchFamily="49" charset="0"/>
+              </a:rPr>
+              <a:t>(', </a:t>
+            </a:r>
+            <a:r>
+              <a:rPr lang="en-US" sz="1800" noProof="1">
+                <a:solidFill>
+                  <a:srgbClr val="8CF4F2"/>
+                </a:solidFill>
+                <a:latin typeface="Consolas" pitchFamily="49" charset="0"/>
+                <a:cs typeface="Consolas" pitchFamily="49" charset="0"/>
+              </a:rPr>
+              <a:t>')); </a:t>
             </a:r>
             <a:r>
               <a:rPr lang="en-US" sz="1800" noProof="1" smtClean="0">
@@ -16158,7 +16565,7 @@
                 <a:latin typeface="Consolas" pitchFamily="49" charset="0"/>
                 <a:cs typeface="Consolas" pitchFamily="49" charset="0"/>
               </a:rPr>
-              <a:t>")); // result</a:t>
+              <a:t>// result</a:t>
             </a:r>
             <a:r>
               <a:rPr lang="en-US" sz="1800" noProof="1">
@@ -16171,7 +16578,7 @@
               <a:t>: 2, </a:t>
             </a:r>
             <a:r>
-              <a:rPr lang="en-US" sz="1800" noProof="1">
+              <a:rPr lang="en-US" sz="1800" noProof="1" smtClean="0">
                 <a:solidFill>
                   <a:schemeClr val="tx1">
                     <a:lumMod val="20000"/>
@@ -16184,6 +16591,16 @@
               <a:t>23</a:t>
             </a:r>
             <a:r>
+              <a:rPr lang="en-US" sz="1800" noProof="1" smtClean="0">
+                <a:solidFill>
+                  <a:srgbClr val="8CF4F2"/>
+                </a:solidFill>
+                <a:latin typeface="Consolas" pitchFamily="49" charset="0"/>
+                <a:cs typeface="Consolas" pitchFamily="49" charset="0"/>
+              </a:rPr>
+              <a:t>, </a:t>
+            </a:r>
+            <a:r>
               <a:rPr lang="en-US" sz="1800" noProof="1">
                 <a:solidFill>
                   <a:srgbClr val="8CF4F2"/>
@@ -16191,7 +16608,7 @@
                 <a:latin typeface="Consolas" pitchFamily="49" charset="0"/>
                 <a:cs typeface="Consolas" pitchFamily="49" charset="0"/>
               </a:rPr>
-              <a:t>, 4, </a:t>
+              <a:t>4, </a:t>
             </a:r>
             <a:r>
               <a:rPr lang="en-US" sz="1800" noProof="1" smtClean="0">
@@ -16849,7 +17266,17 @@
                 <a:latin typeface="Consolas" pitchFamily="49" charset="0"/>
                 <a:cs typeface="Consolas" pitchFamily="49" charset="0"/>
               </a:rPr>
-              <a:t>0 : (a&gt;b</a:t>
+              <a:t>0 : (</a:t>
+            </a:r>
+            <a:r>
+              <a:rPr lang="en-US" sz="1800" noProof="1" smtClean="0">
+                <a:solidFill>
+                  <a:srgbClr val="8CF4F2"/>
+                </a:solidFill>
+                <a:latin typeface="Consolas" pitchFamily="49" charset="0"/>
+                <a:cs typeface="Consolas" pitchFamily="49" charset="0"/>
+              </a:rPr>
+              <a:t>a &gt; b</a:t>
             </a:r>
             <a:r>
               <a:rPr lang="en-US" sz="1800" noProof="1" smtClean="0">
@@ -17005,18 +17432,15 @@
                 <a:latin typeface="Consolas" pitchFamily="49" charset="0"/>
                 <a:cs typeface="Consolas" pitchFamily="49" charset="0"/>
               </a:rPr>
-              <a:t>console.log(numbers.join(", </a:t>
-            </a:r>
-            <a:r>
-              <a:rPr lang="en-US" sz="1800" noProof="1" smtClean="0">
-                <a:solidFill>
-                  <a:srgbClr val="8CF4F2"/>
-                </a:solidFill>
-                <a:latin typeface="Consolas" pitchFamily="49" charset="0"/>
-                <a:cs typeface="Consolas" pitchFamily="49" charset="0"/>
-              </a:rPr>
-              <a:t>"));</a:t>
-            </a:r>
+              <a:t>console.log(numbers.join(', '));</a:t>
+            </a:r>
+            <a:endParaRPr lang="en-US" sz="1800" noProof="1" smtClean="0">
+              <a:solidFill>
+                <a:srgbClr val="8CF4F2"/>
+              </a:solidFill>
+              <a:latin typeface="Consolas" pitchFamily="49" charset="0"/>
+              <a:cs typeface="Consolas" pitchFamily="49" charset="0"/>
+            </a:endParaRPr>
           </a:p>
           <a:p>
             <a:pPr marL="0" indent="0">
@@ -18372,7 +18796,33 @@
                 <a:latin typeface="Consolas" panose="020B0609020204030204" pitchFamily="49" charset="0"/>
                 <a:cs typeface="Consolas" panose="020B0609020204030204" pitchFamily="49" charset="0"/>
               </a:rPr>
-              <a:t>typeof([1,2,3]) </a:t>
+              <a:t>typeof([1</a:t>
+            </a:r>
+            <a:r>
+              <a:rPr lang="en-US" noProof="1" smtClean="0">
+                <a:solidFill>
+                  <a:schemeClr val="accent5">
+                    <a:lumMod val="20000"/>
+                    <a:lumOff val="80000"/>
+                  </a:schemeClr>
+                </a:solidFill>
+                <a:latin typeface="Consolas" panose="020B0609020204030204" pitchFamily="49" charset="0"/>
+                <a:cs typeface="Consolas" panose="020B0609020204030204" pitchFamily="49" charset="0"/>
+              </a:rPr>
+              <a:t>, 2, 3</a:t>
+            </a:r>
+            <a:r>
+              <a:rPr lang="en-US" noProof="1" smtClean="0">
+                <a:solidFill>
+                  <a:schemeClr val="accent5">
+                    <a:lumMod val="20000"/>
+                    <a:lumOff val="80000"/>
+                  </a:schemeClr>
+                </a:solidFill>
+                <a:latin typeface="Consolas" panose="020B0609020204030204" pitchFamily="49" charset="0"/>
+                <a:cs typeface="Consolas" panose="020B0609020204030204" pitchFamily="49" charset="0"/>
+              </a:rPr>
+              <a:t>]) </a:t>
             </a:r>
             <a:r>
               <a:rPr lang="en-US" noProof="1" smtClean="0">
@@ -18425,7 +18875,33 @@
                 <a:latin typeface="Consolas" panose="020B0609020204030204" pitchFamily="49" charset="0"/>
                 <a:cs typeface="Consolas" panose="020B0609020204030204" pitchFamily="49" charset="0"/>
               </a:rPr>
-              <a:t>[1,2,3]</a:t>
+              <a:t>[1</a:t>
+            </a:r>
+            <a:r>
+              <a:rPr lang="en-US" noProof="1" smtClean="0">
+                <a:solidFill>
+                  <a:schemeClr val="accent5">
+                    <a:lumMod val="20000"/>
+                    <a:lumOff val="80000"/>
+                  </a:schemeClr>
+                </a:solidFill>
+                <a:latin typeface="Consolas" panose="020B0609020204030204" pitchFamily="49" charset="0"/>
+                <a:cs typeface="Consolas" panose="020B0609020204030204" pitchFamily="49" charset="0"/>
+              </a:rPr>
+              <a:t>, 2, 3</a:t>
+            </a:r>
+            <a:r>
+              <a:rPr lang="en-US" noProof="1">
+                <a:solidFill>
+                  <a:schemeClr val="accent5">
+                    <a:lumMod val="20000"/>
+                    <a:lumOff val="80000"/>
+                  </a:schemeClr>
+                </a:solidFill>
+                <a:latin typeface="Consolas" panose="020B0609020204030204" pitchFamily="49" charset="0"/>
+                <a:cs typeface="Consolas" panose="020B0609020204030204" pitchFamily="49" charset="0"/>
+              </a:rPr>
+              <a:t>]</a:t>
             </a:r>
             <a:r>
               <a:rPr lang="en-US" noProof="1" smtClean="0">
@@ -21695,8 +22171,124 @@
                 <a:latin typeface="Consolas" pitchFamily="49" charset="0"/>
                 <a:cs typeface="Consolas" pitchFamily="49" charset="0"/>
               </a:rPr>
-              <a:t>var weekDays = ["Monday", "Tuesday", "Wednesday",</a:t>
-            </a:r>
+              <a:t>var weekDays = </a:t>
+            </a:r>
+            <a:r>
+              <a:rPr lang="en-US" sz="2200" b="1" noProof="1">
+                <a:solidFill>
+                  <a:srgbClr val="8CF4F2"/>
+                </a:solidFill>
+                <a:effectLst>
+                  <a:outerShdw blurRad="38100" dist="38100" dir="2700000" algn="tl">
+                    <a:srgbClr val="000000">
+                      <a:alpha val="43137"/>
+                    </a:srgbClr>
+                  </a:outerShdw>
+                </a:effectLst>
+                <a:latin typeface="Consolas" pitchFamily="49" charset="0"/>
+                <a:cs typeface="Consolas" pitchFamily="49" charset="0"/>
+              </a:rPr>
+              <a:t>['Monday</a:t>
+            </a:r>
+            <a:r>
+              <a:rPr lang="en-US" sz="2200" b="1" noProof="1">
+                <a:solidFill>
+                  <a:srgbClr val="8CF4F2"/>
+                </a:solidFill>
+                <a:effectLst>
+                  <a:outerShdw blurRad="38100" dist="38100" dir="2700000" algn="tl">
+                    <a:srgbClr val="000000">
+                      <a:alpha val="43137"/>
+                    </a:srgbClr>
+                  </a:outerShdw>
+                </a:effectLst>
+                <a:latin typeface="Consolas" pitchFamily="49" charset="0"/>
+                <a:cs typeface="Consolas" pitchFamily="49" charset="0"/>
+              </a:rPr>
+              <a:t>', </a:t>
+            </a:r>
+            <a:r>
+              <a:rPr lang="en-US" sz="2200" b="1" noProof="1" smtClean="0">
+                <a:solidFill>
+                  <a:srgbClr val="8CF4F2"/>
+                </a:solidFill>
+                <a:effectLst>
+                  <a:outerShdw blurRad="38100" dist="38100" dir="2700000" algn="tl">
+                    <a:srgbClr val="000000">
+                      <a:alpha val="43137"/>
+                    </a:srgbClr>
+                  </a:outerShdw>
+                </a:effectLst>
+                <a:latin typeface="Consolas" pitchFamily="49" charset="0"/>
+                <a:cs typeface="Consolas" pitchFamily="49" charset="0"/>
+              </a:rPr>
+              <a:t>'Tuesday</a:t>
+            </a:r>
+            <a:r>
+              <a:rPr lang="en-US" sz="2200" b="1" noProof="1">
+                <a:solidFill>
+                  <a:srgbClr val="8CF4F2"/>
+                </a:solidFill>
+                <a:effectLst>
+                  <a:outerShdw blurRad="38100" dist="38100" dir="2700000" algn="tl">
+                    <a:srgbClr val="000000">
+                      <a:alpha val="43137"/>
+                    </a:srgbClr>
+                  </a:outerShdw>
+                </a:effectLst>
+                <a:latin typeface="Consolas" pitchFamily="49" charset="0"/>
+                <a:cs typeface="Consolas" pitchFamily="49" charset="0"/>
+              </a:rPr>
+              <a:t>', </a:t>
+            </a:r>
+            <a:r>
+              <a:rPr lang="en-US" sz="2200" b="1" noProof="1" smtClean="0">
+                <a:solidFill>
+                  <a:srgbClr val="8CF4F2"/>
+                </a:solidFill>
+                <a:effectLst>
+                  <a:outerShdw blurRad="38100" dist="38100" dir="2700000" algn="tl">
+                    <a:srgbClr val="000000">
+                      <a:alpha val="43137"/>
+                    </a:srgbClr>
+                  </a:outerShdw>
+                </a:effectLst>
+                <a:latin typeface="Consolas" pitchFamily="49" charset="0"/>
+                <a:cs typeface="Consolas" pitchFamily="49" charset="0"/>
+              </a:rPr>
+              <a:t>'Wednesday</a:t>
+            </a:r>
+            <a:r>
+              <a:rPr lang="en-US" sz="2200" b="1" noProof="1">
+                <a:solidFill>
+                  <a:srgbClr val="8CF4F2"/>
+                </a:solidFill>
+                <a:effectLst>
+                  <a:outerShdw blurRad="38100" dist="38100" dir="2700000" algn="tl">
+                    <a:srgbClr val="000000">
+                      <a:alpha val="43137"/>
+                    </a:srgbClr>
+                  </a:outerShdw>
+                </a:effectLst>
+                <a:latin typeface="Consolas" pitchFamily="49" charset="0"/>
+                <a:cs typeface="Consolas" pitchFamily="49" charset="0"/>
+              </a:rPr>
+              <a:t>',</a:t>
+            </a:r>
+            <a:endParaRPr lang="en-US" sz="2200" b="1" noProof="1" smtClean="0">
+              <a:solidFill>
+                <a:srgbClr val="8CF4F2"/>
+              </a:solidFill>
+              <a:effectLst>
+                <a:outerShdw blurRad="38100" dist="38100" dir="2700000" algn="tl">
+                  <a:srgbClr val="000000">
+                    <a:alpha val="43137"/>
+                  </a:srgbClr>
+                </a:outerShdw>
+              </a:effectLst>
+              <a:latin typeface="Consolas" pitchFamily="49" charset="0"/>
+              <a:cs typeface="Consolas" pitchFamily="49" charset="0"/>
+            </a:endParaRPr>
           </a:p>
           <a:p>
             <a:pPr eaLnBrk="0" hangingPunct="0">
@@ -21726,7 +22318,160 @@
                 <a:latin typeface="Consolas" pitchFamily="49" charset="0"/>
                 <a:cs typeface="Consolas" pitchFamily="49" charset="0"/>
               </a:rPr>
-              <a:t>  "Thursday", "Friday", "Saturday", "Sunday"]</a:t>
+              <a:t>  </a:t>
+            </a:r>
+            <a:r>
+              <a:rPr lang="en-US" sz="2200" b="1" noProof="1">
+                <a:solidFill>
+                  <a:srgbClr val="8CF4F2"/>
+                </a:solidFill>
+                <a:effectLst>
+                  <a:outerShdw blurRad="38100" dist="38100" dir="2700000" algn="tl">
+                    <a:srgbClr val="000000">
+                      <a:alpha val="43137"/>
+                    </a:srgbClr>
+                  </a:outerShdw>
+                </a:effectLst>
+                <a:latin typeface="Consolas" pitchFamily="49" charset="0"/>
+                <a:cs typeface="Consolas" pitchFamily="49" charset="0"/>
+              </a:rPr>
+              <a:t>'</a:t>
+            </a:r>
+            <a:r>
+              <a:rPr lang="en-US" sz="2200" b="1" noProof="1" smtClean="0">
+                <a:solidFill>
+                  <a:srgbClr val="8CF4F2"/>
+                </a:solidFill>
+                <a:effectLst>
+                  <a:outerShdw blurRad="38100" dist="38100" dir="2700000" algn="tl">
+                    <a:srgbClr val="000000">
+                      <a:alpha val="43137"/>
+                    </a:srgbClr>
+                  </a:outerShdw>
+                </a:effectLst>
+                <a:latin typeface="Consolas" pitchFamily="49" charset="0"/>
+                <a:cs typeface="Consolas" pitchFamily="49" charset="0"/>
+              </a:rPr>
+              <a:t>Thursday</a:t>
+            </a:r>
+            <a:r>
+              <a:rPr lang="en-US" sz="2200" b="1" noProof="1">
+                <a:solidFill>
+                  <a:srgbClr val="8CF4F2"/>
+                </a:solidFill>
+                <a:effectLst>
+                  <a:outerShdw blurRad="38100" dist="38100" dir="2700000" algn="tl">
+                    <a:srgbClr val="000000">
+                      <a:alpha val="43137"/>
+                    </a:srgbClr>
+                  </a:outerShdw>
+                </a:effectLst>
+                <a:latin typeface="Consolas" pitchFamily="49" charset="0"/>
+                <a:cs typeface="Consolas" pitchFamily="49" charset="0"/>
+              </a:rPr>
+              <a:t>', '</a:t>
+            </a:r>
+            <a:r>
+              <a:rPr lang="en-US" sz="2200" b="1" noProof="1" smtClean="0">
+                <a:solidFill>
+                  <a:srgbClr val="8CF4F2"/>
+                </a:solidFill>
+                <a:effectLst>
+                  <a:outerShdw blurRad="38100" dist="38100" dir="2700000" algn="tl">
+                    <a:srgbClr val="000000">
+                      <a:alpha val="43137"/>
+                    </a:srgbClr>
+                  </a:outerShdw>
+                </a:effectLst>
+                <a:latin typeface="Consolas" pitchFamily="49" charset="0"/>
+                <a:cs typeface="Consolas" pitchFamily="49" charset="0"/>
+              </a:rPr>
+              <a:t>Friday</a:t>
+            </a:r>
+            <a:r>
+              <a:rPr lang="en-US" sz="2200" b="1" noProof="1">
+                <a:solidFill>
+                  <a:srgbClr val="8CF4F2"/>
+                </a:solidFill>
+                <a:effectLst>
+                  <a:outerShdw blurRad="38100" dist="38100" dir="2700000" algn="tl">
+                    <a:srgbClr val="000000">
+                      <a:alpha val="43137"/>
+                    </a:srgbClr>
+                  </a:outerShdw>
+                </a:effectLst>
+                <a:latin typeface="Consolas" pitchFamily="49" charset="0"/>
+                <a:cs typeface="Consolas" pitchFamily="49" charset="0"/>
+              </a:rPr>
+              <a:t>', '</a:t>
+            </a:r>
+            <a:r>
+              <a:rPr lang="en-US" sz="2200" b="1" noProof="1" smtClean="0">
+                <a:solidFill>
+                  <a:srgbClr val="8CF4F2"/>
+                </a:solidFill>
+                <a:effectLst>
+                  <a:outerShdw blurRad="38100" dist="38100" dir="2700000" algn="tl">
+                    <a:srgbClr val="000000">
+                      <a:alpha val="43137"/>
+                    </a:srgbClr>
+                  </a:outerShdw>
+                </a:effectLst>
+                <a:latin typeface="Consolas" pitchFamily="49" charset="0"/>
+                <a:cs typeface="Consolas" pitchFamily="49" charset="0"/>
+              </a:rPr>
+              <a:t>Saturday</a:t>
+            </a:r>
+            <a:r>
+              <a:rPr lang="en-US" sz="2200" b="1" noProof="1">
+                <a:solidFill>
+                  <a:srgbClr val="8CF4F2"/>
+                </a:solidFill>
+                <a:effectLst>
+                  <a:outerShdw blurRad="38100" dist="38100" dir="2700000" algn="tl">
+                    <a:srgbClr val="000000">
+                      <a:alpha val="43137"/>
+                    </a:srgbClr>
+                  </a:outerShdw>
+                </a:effectLst>
+                <a:latin typeface="Consolas" pitchFamily="49" charset="0"/>
+                <a:cs typeface="Consolas" pitchFamily="49" charset="0"/>
+              </a:rPr>
+              <a:t>', '</a:t>
+            </a:r>
+            <a:r>
+              <a:rPr lang="en-US" sz="2200" b="1" noProof="1" smtClean="0">
+                <a:solidFill>
+                  <a:srgbClr val="8CF4F2"/>
+                </a:solidFill>
+                <a:effectLst>
+                  <a:outerShdw blurRad="38100" dist="38100" dir="2700000" algn="tl">
+                    <a:srgbClr val="000000">
+                      <a:alpha val="43137"/>
+                    </a:srgbClr>
+                  </a:outerShdw>
+                </a:effectLst>
+                <a:latin typeface="Consolas" pitchFamily="49" charset="0"/>
+                <a:cs typeface="Consolas" pitchFamily="49" charset="0"/>
+              </a:rPr>
+              <a:t>Sunday</a:t>
+            </a:r>
+            <a:r>
+              <a:rPr lang="en-US" sz="2200" b="1" noProof="1">
+                <a:solidFill>
+                  <a:srgbClr val="8CF4F2"/>
+                </a:solidFill>
+                <a:effectLst>
+                  <a:outerShdw blurRad="38100" dist="38100" dir="2700000" algn="tl">
+                    <a:srgbClr val="000000">
+                      <a:alpha val="43137"/>
+                    </a:srgbClr>
+                  </a:outerShdw>
+                </a:effectLst>
+                <a:latin typeface="Consolas" pitchFamily="49" charset="0"/>
+                <a:cs typeface="Consolas" pitchFamily="49" charset="0"/>
+              </a:rPr>
+              <a:t>']</a:t>
             </a:r>
             <a:endParaRPr lang="en-US" sz="2200" b="1" noProof="1">
               <a:solidFill>
@@ -21836,8 +22581,56 @@
                 <a:latin typeface="Consolas" pitchFamily="49" charset="0"/>
                 <a:cs typeface="Consolas" pitchFamily="49" charset="0"/>
               </a:rPr>
-              <a:t>[1, new Date(), "hello"];</a:t>
-            </a:r>
+              <a:t>[1, new Date(), </a:t>
+            </a:r>
+            <a:r>
+              <a:rPr lang="en-US" sz="2200" b="1" noProof="1" smtClean="0">
+                <a:solidFill>
+                  <a:srgbClr val="8CF4F2"/>
+                </a:solidFill>
+                <a:effectLst>
+                  <a:outerShdw blurRad="38100" dist="38100" dir="2700000" algn="tl">
+                    <a:srgbClr val="000000">
+                      <a:alpha val="43137"/>
+                    </a:srgbClr>
+                  </a:outerShdw>
+                </a:effectLst>
+                <a:latin typeface="Consolas" pitchFamily="49" charset="0"/>
+                <a:cs typeface="Consolas" pitchFamily="49" charset="0"/>
+              </a:rPr>
+              <a:t>'hello</a:t>
+            </a:r>
+            <a:r>
+              <a:rPr lang="en-US" sz="2200" b="1" noProof="1">
+                <a:solidFill>
+                  <a:srgbClr val="8CF4F2"/>
+                </a:solidFill>
+                <a:effectLst>
+                  <a:outerShdw blurRad="38100" dist="38100" dir="2700000" algn="tl">
+                    <a:srgbClr val="000000">
+                      <a:alpha val="43137"/>
+                    </a:srgbClr>
+                  </a:outerShdw>
+                </a:effectLst>
+                <a:latin typeface="Consolas" pitchFamily="49" charset="0"/>
+                <a:cs typeface="Consolas" pitchFamily="49" charset="0"/>
+              </a:rPr>
+              <a:t>'];</a:t>
+            </a:r>
+            <a:endParaRPr lang="en-US" sz="2200" b="1" noProof="1" smtClean="0">
+              <a:solidFill>
+                <a:srgbClr val="8CF4F2"/>
+              </a:solidFill>
+              <a:effectLst>
+                <a:outerShdw blurRad="38100" dist="38100" dir="2700000" algn="tl">
+                  <a:srgbClr val="000000">
+                    <a:alpha val="43137"/>
+                  </a:srgbClr>
+                </a:outerShdw>
+              </a:effectLst>
+              <a:latin typeface="Consolas" pitchFamily="49" charset="0"/>
+              <a:cs typeface="Consolas" pitchFamily="49" charset="0"/>
+            </a:endParaRPr>
           </a:p>
           <a:p>
             <a:pPr eaLnBrk="0" hangingPunct="0">
@@ -21946,7 +22739,7 @@
                 <a:latin typeface="Consolas" pitchFamily="49" charset="0"/>
                 <a:cs typeface="Consolas" pitchFamily="49" charset="0"/>
               </a:rPr>
-              <a:t>["0,0", "0,1", "0,2</a:t>
+              <a:t>[</a:t>
             </a:r>
             <a:r>
               <a:rPr lang="en-US" sz="2200" b="1" noProof="1" smtClean="0">
@@ -21963,7 +22756,92 @@
                 <a:latin typeface="Consolas" pitchFamily="49" charset="0"/>
                 <a:cs typeface="Consolas" pitchFamily="49" charset="0"/>
               </a:rPr>
-              <a:t>"],</a:t>
+              <a:t>'0,0</a:t>
+            </a:r>
+            <a:r>
+              <a:rPr lang="en-US" sz="2200" b="1" noProof="1">
+                <a:solidFill>
+                  <a:srgbClr val="8CF4F2"/>
+                </a:solidFill>
+                <a:effectLst>
+                  <a:outerShdw blurRad="38100" dist="38100" dir="2700000" algn="tl">
+                    <a:srgbClr val="000000">
+                      <a:alpha val="43137"/>
+                    </a:srgbClr>
+                  </a:outerShdw>
+                </a:effectLst>
+                <a:latin typeface="Consolas" pitchFamily="49" charset="0"/>
+                <a:cs typeface="Consolas" pitchFamily="49" charset="0"/>
+              </a:rPr>
+              <a:t>', </a:t>
+            </a:r>
+            <a:r>
+              <a:rPr lang="en-US" sz="2200" b="1" noProof="1" smtClean="0">
+                <a:solidFill>
+                  <a:srgbClr val="8CF4F2"/>
+                </a:solidFill>
+                <a:effectLst>
+                  <a:outerShdw blurRad="38100" dist="38100" dir="2700000" algn="tl">
+                    <a:srgbClr val="000000">
+                      <a:alpha val="43137"/>
+                    </a:srgbClr>
+                  </a:outerShdw>
+                </a:effectLst>
+                <a:latin typeface="Consolas" pitchFamily="49" charset="0"/>
+                <a:cs typeface="Consolas" pitchFamily="49" charset="0"/>
+              </a:rPr>
+              <a:t>'0,1</a:t>
+            </a:r>
+            <a:r>
+              <a:rPr lang="en-US" sz="2200" b="1" noProof="1">
+                <a:solidFill>
+                  <a:srgbClr val="8CF4F2"/>
+                </a:solidFill>
+                <a:effectLst>
+                  <a:outerShdw blurRad="38100" dist="38100" dir="2700000" algn="tl">
+                    <a:srgbClr val="000000">
+                      <a:alpha val="43137"/>
+                    </a:srgbClr>
+                  </a:outerShdw>
+                </a:effectLst>
+                <a:latin typeface="Consolas" pitchFamily="49" charset="0"/>
+                <a:cs typeface="Consolas" pitchFamily="49" charset="0"/>
+              </a:rPr>
+              <a:t>', </a:t>
+            </a:r>
+            <a:r>
+              <a:rPr lang="en-US" sz="2200" b="1" noProof="1" smtClean="0">
+                <a:solidFill>
+                  <a:srgbClr val="8CF4F2"/>
+                </a:solidFill>
+                <a:effectLst>
+                  <a:outerShdw blurRad="38100" dist="38100" dir="2700000" algn="tl">
+                    <a:srgbClr val="000000">
+                      <a:alpha val="43137"/>
+                    </a:srgbClr>
+                  </a:outerShdw>
+                </a:effectLst>
+                <a:latin typeface="Consolas" pitchFamily="49" charset="0"/>
+                <a:cs typeface="Consolas" pitchFamily="49" charset="0"/>
+              </a:rPr>
+              <a:t>'0,2</a:t>
+            </a:r>
+            <a:r>
+              <a:rPr lang="en-US" sz="2200" b="1" noProof="1">
+                <a:solidFill>
+                  <a:srgbClr val="8CF4F2"/>
+                </a:solidFill>
+                <a:effectLst>
+                  <a:outerShdw blurRad="38100" dist="38100" dir="2700000" algn="tl">
+                    <a:srgbClr val="000000">
+                      <a:alpha val="43137"/>
+                    </a:srgbClr>
+                  </a:outerShdw>
+                </a:effectLst>
+                <a:latin typeface="Consolas" pitchFamily="49" charset="0"/>
+                <a:cs typeface="Consolas" pitchFamily="49" charset="0"/>
+              </a:rPr>
+              <a:t>'],</a:t>
             </a:r>
             <a:endParaRPr lang="en-US" sz="2200" b="1" noProof="1">
               <a:solidFill>
@@ -22025,7 +22903,7 @@
                 <a:latin typeface="Consolas" pitchFamily="49" charset="0"/>
                 <a:cs typeface="Consolas" pitchFamily="49" charset="0"/>
               </a:rPr>
-              <a:t>["1,0", "1,1", "1,2</a:t>
+              <a:t>[</a:t>
             </a:r>
             <a:r>
               <a:rPr lang="en-US" sz="2200" b="1" noProof="1" smtClean="0">
@@ -22042,7 +22920,92 @@
                 <a:latin typeface="Consolas" pitchFamily="49" charset="0"/>
                 <a:cs typeface="Consolas" pitchFamily="49" charset="0"/>
               </a:rPr>
-              <a:t>"],</a:t>
+              <a:t>'1,0</a:t>
+            </a:r>
+            <a:r>
+              <a:rPr lang="en-US" sz="2200" b="1" noProof="1">
+                <a:solidFill>
+                  <a:srgbClr val="8CF4F2"/>
+                </a:solidFill>
+                <a:effectLst>
+                  <a:outerShdw blurRad="38100" dist="38100" dir="2700000" algn="tl">
+                    <a:srgbClr val="000000">
+                      <a:alpha val="43137"/>
+                    </a:srgbClr>
+                  </a:outerShdw>
+                </a:effectLst>
+                <a:latin typeface="Consolas" pitchFamily="49" charset="0"/>
+                <a:cs typeface="Consolas" pitchFamily="49" charset="0"/>
+              </a:rPr>
+              <a:t>', </a:t>
+            </a:r>
+            <a:r>
+              <a:rPr lang="en-US" sz="2200" b="1" noProof="1" smtClean="0">
+                <a:solidFill>
+                  <a:srgbClr val="8CF4F2"/>
+                </a:solidFill>
+                <a:effectLst>
+                  <a:outerShdw blurRad="38100" dist="38100" dir="2700000" algn="tl">
+                    <a:srgbClr val="000000">
+                      <a:alpha val="43137"/>
+                    </a:srgbClr>
+                  </a:outerShdw>
+                </a:effectLst>
+                <a:latin typeface="Consolas" pitchFamily="49" charset="0"/>
+                <a:cs typeface="Consolas" pitchFamily="49" charset="0"/>
+              </a:rPr>
+              <a:t>'1,1</a:t>
+            </a:r>
+            <a:r>
+              <a:rPr lang="en-US" sz="2200" b="1" noProof="1">
+                <a:solidFill>
+                  <a:srgbClr val="8CF4F2"/>
+                </a:solidFill>
+                <a:effectLst>
+                  <a:outerShdw blurRad="38100" dist="38100" dir="2700000" algn="tl">
+                    <a:srgbClr val="000000">
+                      <a:alpha val="43137"/>
+                    </a:srgbClr>
+                  </a:outerShdw>
+                </a:effectLst>
+                <a:latin typeface="Consolas" pitchFamily="49" charset="0"/>
+                <a:cs typeface="Consolas" pitchFamily="49" charset="0"/>
+              </a:rPr>
+              <a:t>', </a:t>
+            </a:r>
+            <a:r>
+              <a:rPr lang="en-US" sz="2200" b="1" noProof="1" smtClean="0">
+                <a:solidFill>
+                  <a:srgbClr val="8CF4F2"/>
+                </a:solidFill>
+                <a:effectLst>
+                  <a:outerShdw blurRad="38100" dist="38100" dir="2700000" algn="tl">
+                    <a:srgbClr val="000000">
+                      <a:alpha val="43137"/>
+                    </a:srgbClr>
+                  </a:outerShdw>
+                </a:effectLst>
+                <a:latin typeface="Consolas" pitchFamily="49" charset="0"/>
+                <a:cs typeface="Consolas" pitchFamily="49" charset="0"/>
+              </a:rPr>
+              <a:t>'1,2</a:t>
+            </a:r>
+            <a:r>
+              <a:rPr lang="en-US" sz="2200" b="1" noProof="1">
+                <a:solidFill>
+                  <a:srgbClr val="8CF4F2"/>
+                </a:solidFill>
+                <a:effectLst>
+                  <a:outerShdw blurRad="38100" dist="38100" dir="2700000" algn="tl">
+                    <a:srgbClr val="000000">
+                      <a:alpha val="43137"/>
+                    </a:srgbClr>
+                  </a:outerShdw>
+                </a:effectLst>
+                <a:latin typeface="Consolas" pitchFamily="49" charset="0"/>
+                <a:cs typeface="Consolas" pitchFamily="49" charset="0"/>
+              </a:rPr>
+              <a:t>'],</a:t>
             </a:r>
             <a:endParaRPr lang="en-US" sz="2200" b="1" noProof="1">
               <a:solidFill>
@@ -22104,7 +23067,7 @@
                 <a:latin typeface="Consolas" pitchFamily="49" charset="0"/>
                 <a:cs typeface="Consolas" pitchFamily="49" charset="0"/>
               </a:rPr>
-              <a:t>["2,0", "2,1", "2,2</a:t>
+              <a:t>[</a:t>
             </a:r>
             <a:r>
               <a:rPr lang="en-US" sz="2200" b="1" noProof="1" smtClean="0">
@@ -22121,7 +23084,92 @@
                 <a:latin typeface="Consolas" pitchFamily="49" charset="0"/>
                 <a:cs typeface="Consolas" pitchFamily="49" charset="0"/>
               </a:rPr>
-              <a:t>"]];</a:t>
+              <a:t>'2,0</a:t>
+            </a:r>
+            <a:r>
+              <a:rPr lang="en-US" sz="2200" b="1" noProof="1">
+                <a:solidFill>
+                  <a:srgbClr val="8CF4F2"/>
+                </a:solidFill>
+                <a:effectLst>
+                  <a:outerShdw blurRad="38100" dist="38100" dir="2700000" algn="tl">
+                    <a:srgbClr val="000000">
+                      <a:alpha val="43137"/>
+                    </a:srgbClr>
+                  </a:outerShdw>
+                </a:effectLst>
+                <a:latin typeface="Consolas" pitchFamily="49" charset="0"/>
+                <a:cs typeface="Consolas" pitchFamily="49" charset="0"/>
+              </a:rPr>
+              <a:t>', </a:t>
+            </a:r>
+            <a:r>
+              <a:rPr lang="en-US" sz="2200" b="1" noProof="1" smtClean="0">
+                <a:solidFill>
+                  <a:srgbClr val="8CF4F2"/>
+                </a:solidFill>
+                <a:effectLst>
+                  <a:outerShdw blurRad="38100" dist="38100" dir="2700000" algn="tl">
+                    <a:srgbClr val="000000">
+                      <a:alpha val="43137"/>
+                    </a:srgbClr>
+                  </a:outerShdw>
+                </a:effectLst>
+                <a:latin typeface="Consolas" pitchFamily="49" charset="0"/>
+                <a:cs typeface="Consolas" pitchFamily="49" charset="0"/>
+              </a:rPr>
+              <a:t>'2,1</a:t>
+            </a:r>
+            <a:r>
+              <a:rPr lang="en-US" sz="2200" b="1" noProof="1">
+                <a:solidFill>
+                  <a:srgbClr val="8CF4F2"/>
+                </a:solidFill>
+                <a:effectLst>
+                  <a:outerShdw blurRad="38100" dist="38100" dir="2700000" algn="tl">
+                    <a:srgbClr val="000000">
+                      <a:alpha val="43137"/>
+                    </a:srgbClr>
+                  </a:outerShdw>
+                </a:effectLst>
+                <a:latin typeface="Consolas" pitchFamily="49" charset="0"/>
+                <a:cs typeface="Consolas" pitchFamily="49" charset="0"/>
+              </a:rPr>
+              <a:t>', </a:t>
+            </a:r>
+            <a:r>
+              <a:rPr lang="en-US" sz="2200" b="1" noProof="1" smtClean="0">
+                <a:solidFill>
+                  <a:srgbClr val="8CF4F2"/>
+                </a:solidFill>
+                <a:effectLst>
+                  <a:outerShdw blurRad="38100" dist="38100" dir="2700000" algn="tl">
+                    <a:srgbClr val="000000">
+                      <a:alpha val="43137"/>
+                    </a:srgbClr>
+                  </a:outerShdw>
+                </a:effectLst>
+                <a:latin typeface="Consolas" pitchFamily="49" charset="0"/>
+                <a:cs typeface="Consolas" pitchFamily="49" charset="0"/>
+              </a:rPr>
+              <a:t>'2,2</a:t>
+            </a:r>
+            <a:r>
+              <a:rPr lang="en-US" sz="2200" b="1" noProof="1">
+                <a:solidFill>
+                  <a:srgbClr val="8CF4F2"/>
+                </a:solidFill>
+                <a:effectLst>
+                  <a:outerShdw blurRad="38100" dist="38100" dir="2700000" algn="tl">
+                    <a:srgbClr val="000000">
+                      <a:alpha val="43137"/>
+                    </a:srgbClr>
+                  </a:outerShdw>
+                </a:effectLst>
+                <a:latin typeface="Consolas" pitchFamily="49" charset="0"/>
+                <a:cs typeface="Consolas" pitchFamily="49" charset="0"/>
+              </a:rPr>
+              <a:t>']];</a:t>
             </a:r>
             <a:r>
               <a:rPr lang="en-US" sz="2200" b="1" noProof="1">

</xml_diff>